<commit_message>
works on my mac now
</commit_message>
<xml_diff>
--- a/docs/demo_z_analysis.pptx
+++ b/docs/demo_z_analysis.pptx
@@ -4978,7 +4978,7 @@
         <p:spPr>
           <a:xfrm>
             <a:off x="4672523" y="1511590"/>
-            <a:ext cx="4064001" cy="3899147"/>
+            <a:ext cx="4064000" cy="3899147"/>
           </a:xfrm>
           <a:prstGeom prst="rect">
             <a:avLst/>
@@ -4993,8 +4993,8 @@
         </p:nvSpPr>
         <p:spPr>
           <a:xfrm>
-            <a:off x="6321778" y="4402667"/>
-            <a:ext cx="959555" cy="921926"/>
+            <a:off x="6074228" y="3715926"/>
+            <a:ext cx="1260592" cy="1081853"/>
           </a:xfrm>
           <a:prstGeom prst="ellipse">
             <a:avLst/>

</xml_diff>